<commit_message>
Finish all content (#13)
* Add first final version of thesis with comments

- Added first final version with comments
- removed nocite command, as it is not needed anymore
- Rebuild thesis.pdf with minor changes

* Rework first findings

- Reworked all notes found while first reading the thesis.
- Rebuild pdf and replaced "final" Version with current
- Fixed some Typos on presentation slides

* Add final evaluation results

- Added images and Text to Evaluation results
- Added missing figures
- Fixed Typos

-rebuild thesis.pdf

* Add final words and ending

- Added last words as ending of thesis
- Reformatted table for chapter 3
- Added more sources and URLdates, as they are mandatory
- removed Todolist
- removed all todos

- Rebuild PDF
</commit_message>
<xml_diff>
--- a/Präsentation.pptx
+++ b/Präsentation.pptx
@@ -5,10 +5,10 @@
     <p:sldMasterId id="2147483648" r:id="rId1"/>
   </p:sldMasterIdLst>
   <p:notesMasterIdLst>
-    <p:notesMasterId r:id="rId14"/>
+    <p:notesMasterId r:id="rId13"/>
   </p:notesMasterIdLst>
   <p:handoutMasterIdLst>
-    <p:handoutMasterId r:id="rId15"/>
+    <p:handoutMasterId r:id="rId14"/>
   </p:handoutMasterIdLst>
   <p:sldIdLst>
     <p:sldId id="256" r:id="rId2"/>
@@ -21,13 +21,12 @@
     <p:sldId id="309" r:id="rId9"/>
     <p:sldId id="310" r:id="rId10"/>
     <p:sldId id="311" r:id="rId11"/>
-    <p:sldId id="313" r:id="rId12"/>
-    <p:sldId id="312" r:id="rId13"/>
+    <p:sldId id="312" r:id="rId12"/>
   </p:sldIdLst>
   <p:sldSz cx="9144000" cy="5143500" type="screen16x9"/>
   <p:notesSz cx="9874250" cy="6797675"/>
   <p:custDataLst>
-    <p:tags r:id="rId16"/>
+    <p:tags r:id="rId15"/>
   </p:custDataLst>
   <p:defaultTextStyle>
     <a:defPPr>
@@ -1472,545 +1471,6 @@
       <dsp:cNvGrpSpPr/>
     </dsp:nvGrpSpPr>
     <dsp:grpSpPr/>
-    <dsp:sp modelId="{7A25A4F9-92FE-4639-B1C9-56E59C25FDE7}">
-      <dsp:nvSpPr>
-        <dsp:cNvPr id="0" name=""/>
-        <dsp:cNvSpPr/>
-      </dsp:nvSpPr>
-      <dsp:spPr>
-        <a:xfrm>
-          <a:off x="2427" y="0"/>
-          <a:ext cx="1430555" cy="324000"/>
-        </a:xfrm>
-        <a:prstGeom prst="homePlate">
-          <a:avLst/>
-        </a:prstGeom>
-        <a:solidFill>
-          <a:schemeClr val="accent1">
-            <a:hueOff val="0"/>
-            <a:satOff val="0"/>
-            <a:lumOff val="0"/>
-            <a:alphaOff val="0"/>
-          </a:schemeClr>
-        </a:solidFill>
-        <a:ln w="25400" cap="flat" cmpd="sng" algn="ctr">
-          <a:solidFill>
-            <a:schemeClr val="lt1">
-              <a:hueOff val="0"/>
-              <a:satOff val="0"/>
-              <a:lumOff val="0"/>
-              <a:alphaOff val="0"/>
-            </a:schemeClr>
-          </a:solidFill>
-          <a:prstDash val="solid"/>
-        </a:ln>
-        <a:effectLst/>
-      </dsp:spPr>
-      <dsp:style>
-        <a:lnRef idx="2">
-          <a:scrgbClr r="0" g="0" b="0"/>
-        </a:lnRef>
-        <a:fillRef idx="1">
-          <a:scrgbClr r="0" g="0" b="0"/>
-        </a:fillRef>
-        <a:effectRef idx="0">
-          <a:scrgbClr r="0" g="0" b="0"/>
-        </a:effectRef>
-        <a:fontRef idx="minor">
-          <a:schemeClr val="lt1"/>
-        </a:fontRef>
-      </dsp:style>
-      <dsp:txBody>
-        <a:bodyPr spcFirstLastPara="0" vert="horz" wrap="square" lIns="108000" tIns="37338" rIns="18669" bIns="37338" numCol="1" spcCol="1270" anchor="ctr" anchorCtr="0">
-          <a:noAutofit/>
-        </a:bodyPr>
-        <a:lstStyle/>
-        <a:p>
-          <a:pPr lvl="0" algn="l" defTabSz="622300">
-            <a:lnSpc>
-              <a:spcPct val="90000"/>
-            </a:lnSpc>
-            <a:spcBef>
-              <a:spcPct val="0"/>
-            </a:spcBef>
-            <a:spcAft>
-              <a:spcPct val="35000"/>
-            </a:spcAft>
-          </a:pPr>
-          <a:r>
-            <a:rPr lang="de-DE" sz="1400" kern="1200" dirty="0" smtClean="0"/>
-            <a:t>1979</a:t>
-          </a:r>
-          <a:endParaRPr lang="de-DE" sz="1400" kern="1200" dirty="0"/>
-        </a:p>
-      </dsp:txBody>
-      <dsp:txXfrm>
-        <a:off x="2427" y="0"/>
-        <a:ext cx="1349555" cy="324000"/>
-      </dsp:txXfrm>
-    </dsp:sp>
-    <dsp:sp modelId="{3B9C7144-C091-41E2-9700-EEA93255DD05}">
-      <dsp:nvSpPr>
-        <dsp:cNvPr id="0" name=""/>
-        <dsp:cNvSpPr/>
-      </dsp:nvSpPr>
-      <dsp:spPr>
-        <a:xfrm>
-          <a:off x="1146872" y="0"/>
-          <a:ext cx="1430555" cy="324000"/>
-        </a:xfrm>
-        <a:prstGeom prst="chevron">
-          <a:avLst/>
-        </a:prstGeom>
-        <a:solidFill>
-          <a:schemeClr val="accent1">
-            <a:hueOff val="0"/>
-            <a:satOff val="0"/>
-            <a:lumOff val="0"/>
-            <a:alphaOff val="0"/>
-          </a:schemeClr>
-        </a:solidFill>
-        <a:ln w="25400" cap="flat" cmpd="sng" algn="ctr">
-          <a:solidFill>
-            <a:schemeClr val="lt1">
-              <a:hueOff val="0"/>
-              <a:satOff val="0"/>
-              <a:lumOff val="0"/>
-              <a:alphaOff val="0"/>
-            </a:schemeClr>
-          </a:solidFill>
-          <a:prstDash val="solid"/>
-        </a:ln>
-        <a:effectLst/>
-      </dsp:spPr>
-      <dsp:style>
-        <a:lnRef idx="2">
-          <a:scrgbClr r="0" g="0" b="0"/>
-        </a:lnRef>
-        <a:fillRef idx="1">
-          <a:scrgbClr r="0" g="0" b="0"/>
-        </a:fillRef>
-        <a:effectRef idx="0">
-          <a:scrgbClr r="0" g="0" b="0"/>
-        </a:effectRef>
-        <a:fontRef idx="minor">
-          <a:schemeClr val="lt1"/>
-        </a:fontRef>
-      </dsp:style>
-      <dsp:txBody>
-        <a:bodyPr spcFirstLastPara="0" vert="horz" wrap="square" lIns="56007" tIns="37338" rIns="18669" bIns="37338" numCol="1" spcCol="1270" anchor="ctr" anchorCtr="0">
-          <a:noAutofit/>
-        </a:bodyPr>
-        <a:lstStyle/>
-        <a:p>
-          <a:pPr lvl="0" algn="l" defTabSz="622300">
-            <a:lnSpc>
-              <a:spcPct val="90000"/>
-            </a:lnSpc>
-            <a:spcBef>
-              <a:spcPct val="0"/>
-            </a:spcBef>
-            <a:spcAft>
-              <a:spcPct val="35000"/>
-            </a:spcAft>
-          </a:pPr>
-          <a:r>
-            <a:rPr lang="de-DE" sz="1400" kern="1200" dirty="0" smtClean="0"/>
-            <a:t>2000-2005</a:t>
-          </a:r>
-          <a:endParaRPr lang="de-DE" sz="1400" kern="1200" dirty="0"/>
-        </a:p>
-      </dsp:txBody>
-      <dsp:txXfrm>
-        <a:off x="1308872" y="0"/>
-        <a:ext cx="1106555" cy="324000"/>
-      </dsp:txXfrm>
-    </dsp:sp>
-    <dsp:sp modelId="{E354718C-0F6D-4684-A775-BD2BEE290E71}">
-      <dsp:nvSpPr>
-        <dsp:cNvPr id="0" name=""/>
-        <dsp:cNvSpPr/>
-      </dsp:nvSpPr>
-      <dsp:spPr>
-        <a:xfrm>
-          <a:off x="2291316" y="0"/>
-          <a:ext cx="1416393" cy="324000"/>
-        </a:xfrm>
-        <a:prstGeom prst="chevron">
-          <a:avLst/>
-        </a:prstGeom>
-        <a:solidFill>
-          <a:schemeClr val="accent1">
-            <a:hueOff val="0"/>
-            <a:satOff val="0"/>
-            <a:lumOff val="0"/>
-            <a:alphaOff val="0"/>
-          </a:schemeClr>
-        </a:solidFill>
-        <a:ln w="25400" cap="flat" cmpd="sng" algn="ctr">
-          <a:solidFill>
-            <a:schemeClr val="lt1">
-              <a:hueOff val="0"/>
-              <a:satOff val="0"/>
-              <a:lumOff val="0"/>
-              <a:alphaOff val="0"/>
-            </a:schemeClr>
-          </a:solidFill>
-          <a:prstDash val="solid"/>
-        </a:ln>
-        <a:effectLst/>
-      </dsp:spPr>
-      <dsp:style>
-        <a:lnRef idx="2">
-          <a:scrgbClr r="0" g="0" b="0"/>
-        </a:lnRef>
-        <a:fillRef idx="1">
-          <a:scrgbClr r="0" g="0" b="0"/>
-        </a:fillRef>
-        <a:effectRef idx="0">
-          <a:scrgbClr r="0" g="0" b="0"/>
-        </a:effectRef>
-        <a:fontRef idx="minor">
-          <a:schemeClr val="lt1"/>
-        </a:fontRef>
-      </dsp:style>
-      <dsp:txBody>
-        <a:bodyPr spcFirstLastPara="0" vert="horz" wrap="square" lIns="56007" tIns="37338" rIns="18669" bIns="37338" numCol="1" spcCol="1270" anchor="ctr" anchorCtr="0">
-          <a:noAutofit/>
-        </a:bodyPr>
-        <a:lstStyle/>
-        <a:p>
-          <a:pPr lvl="0" algn="l" defTabSz="622300">
-            <a:lnSpc>
-              <a:spcPct val="90000"/>
-            </a:lnSpc>
-            <a:spcBef>
-              <a:spcPct val="0"/>
-            </a:spcBef>
-            <a:spcAft>
-              <a:spcPct val="35000"/>
-            </a:spcAft>
-          </a:pPr>
-          <a:r>
-            <a:rPr lang="de-DE" sz="1400" kern="1200" dirty="0" smtClean="0"/>
-            <a:t>2006</a:t>
-          </a:r>
-          <a:endParaRPr lang="de-DE" sz="1400" kern="1200" dirty="0"/>
-        </a:p>
-      </dsp:txBody>
-      <dsp:txXfrm>
-        <a:off x="2453316" y="0"/>
-        <a:ext cx="1092393" cy="324000"/>
-      </dsp:txXfrm>
-    </dsp:sp>
-    <dsp:sp modelId="{C1DCE1C1-EA7C-41BF-9FB8-80896683CA7B}">
-      <dsp:nvSpPr>
-        <dsp:cNvPr id="0" name=""/>
-        <dsp:cNvSpPr/>
-      </dsp:nvSpPr>
-      <dsp:spPr>
-        <a:xfrm>
-          <a:off x="3421599" y="0"/>
-          <a:ext cx="1430555" cy="324000"/>
-        </a:xfrm>
-        <a:prstGeom prst="chevron">
-          <a:avLst/>
-        </a:prstGeom>
-        <a:solidFill>
-          <a:schemeClr val="accent1">
-            <a:hueOff val="0"/>
-            <a:satOff val="0"/>
-            <a:lumOff val="0"/>
-            <a:alphaOff val="0"/>
-          </a:schemeClr>
-        </a:solidFill>
-        <a:ln w="25400" cap="flat" cmpd="sng" algn="ctr">
-          <a:solidFill>
-            <a:schemeClr val="lt1">
-              <a:hueOff val="0"/>
-              <a:satOff val="0"/>
-              <a:lumOff val="0"/>
-              <a:alphaOff val="0"/>
-            </a:schemeClr>
-          </a:solidFill>
-          <a:prstDash val="solid"/>
-        </a:ln>
-        <a:effectLst/>
-      </dsp:spPr>
-      <dsp:style>
-        <a:lnRef idx="2">
-          <a:scrgbClr r="0" g="0" b="0"/>
-        </a:lnRef>
-        <a:fillRef idx="1">
-          <a:scrgbClr r="0" g="0" b="0"/>
-        </a:fillRef>
-        <a:effectRef idx="0">
-          <a:scrgbClr r="0" g="0" b="0"/>
-        </a:effectRef>
-        <a:fontRef idx="minor">
-          <a:schemeClr val="lt1"/>
-        </a:fontRef>
-      </dsp:style>
-      <dsp:txBody>
-        <a:bodyPr spcFirstLastPara="0" vert="horz" wrap="square" lIns="56007" tIns="37338" rIns="18669" bIns="37338" numCol="1" spcCol="1270" anchor="ctr" anchorCtr="0">
-          <a:noAutofit/>
-        </a:bodyPr>
-        <a:lstStyle/>
-        <a:p>
-          <a:pPr lvl="0" algn="l" defTabSz="622300">
-            <a:lnSpc>
-              <a:spcPct val="90000"/>
-            </a:lnSpc>
-            <a:spcBef>
-              <a:spcPct val="0"/>
-            </a:spcBef>
-            <a:spcAft>
-              <a:spcPct val="35000"/>
-            </a:spcAft>
-          </a:pPr>
-          <a:r>
-            <a:rPr lang="de-DE" sz="1400" kern="1200" dirty="0" smtClean="0"/>
-            <a:t>2008</a:t>
-          </a:r>
-          <a:endParaRPr lang="de-DE" sz="1400" kern="1200" dirty="0"/>
-        </a:p>
-      </dsp:txBody>
-      <dsp:txXfrm>
-        <a:off x="3583599" y="0"/>
-        <a:ext cx="1106555" cy="324000"/>
-      </dsp:txXfrm>
-    </dsp:sp>
-    <dsp:sp modelId="{7DDFB044-1652-457A-BC82-6C9D7F02FADC}">
-      <dsp:nvSpPr>
-        <dsp:cNvPr id="0" name=""/>
-        <dsp:cNvSpPr/>
-      </dsp:nvSpPr>
-      <dsp:spPr>
-        <a:xfrm>
-          <a:off x="4566044" y="0"/>
-          <a:ext cx="1430555" cy="324000"/>
-        </a:xfrm>
-        <a:prstGeom prst="chevron">
-          <a:avLst/>
-        </a:prstGeom>
-        <a:solidFill>
-          <a:schemeClr val="accent1">
-            <a:hueOff val="0"/>
-            <a:satOff val="0"/>
-            <a:lumOff val="0"/>
-            <a:alphaOff val="0"/>
-          </a:schemeClr>
-        </a:solidFill>
-        <a:ln w="25400" cap="flat" cmpd="sng" algn="ctr">
-          <a:solidFill>
-            <a:schemeClr val="lt1">
-              <a:hueOff val="0"/>
-              <a:satOff val="0"/>
-              <a:lumOff val="0"/>
-              <a:alphaOff val="0"/>
-            </a:schemeClr>
-          </a:solidFill>
-          <a:prstDash val="solid"/>
-        </a:ln>
-        <a:effectLst/>
-      </dsp:spPr>
-      <dsp:style>
-        <a:lnRef idx="2">
-          <a:scrgbClr r="0" g="0" b="0"/>
-        </a:lnRef>
-        <a:fillRef idx="1">
-          <a:scrgbClr r="0" g="0" b="0"/>
-        </a:fillRef>
-        <a:effectRef idx="0">
-          <a:scrgbClr r="0" g="0" b="0"/>
-        </a:effectRef>
-        <a:fontRef idx="minor">
-          <a:schemeClr val="lt1"/>
-        </a:fontRef>
-      </dsp:style>
-      <dsp:txBody>
-        <a:bodyPr spcFirstLastPara="0" vert="horz" wrap="square" lIns="108000" tIns="37338" rIns="18669" bIns="37338" numCol="1" spcCol="1270" anchor="ctr" anchorCtr="0">
-          <a:noAutofit/>
-        </a:bodyPr>
-        <a:lstStyle/>
-        <a:p>
-          <a:pPr lvl="0" algn="l" defTabSz="622300">
-            <a:lnSpc>
-              <a:spcPct val="90000"/>
-            </a:lnSpc>
-            <a:spcBef>
-              <a:spcPct val="0"/>
-            </a:spcBef>
-            <a:spcAft>
-              <a:spcPct val="35000"/>
-            </a:spcAft>
-          </a:pPr>
-          <a:r>
-            <a:rPr lang="de-DE" sz="1400" kern="1200" dirty="0" smtClean="0"/>
-            <a:t>2011-2013</a:t>
-          </a:r>
-          <a:endParaRPr lang="de-DE" sz="1400" kern="1200" dirty="0"/>
-        </a:p>
-      </dsp:txBody>
-      <dsp:txXfrm>
-        <a:off x="4728044" y="0"/>
-        <a:ext cx="1106555" cy="324000"/>
-      </dsp:txXfrm>
-    </dsp:sp>
-    <dsp:sp modelId="{462CC564-4798-41B5-B62B-FE7A227FA1AC}">
-      <dsp:nvSpPr>
-        <dsp:cNvPr id="0" name=""/>
-        <dsp:cNvSpPr/>
-      </dsp:nvSpPr>
-      <dsp:spPr>
-        <a:xfrm>
-          <a:off x="5710488" y="0"/>
-          <a:ext cx="1430555" cy="324000"/>
-        </a:xfrm>
-        <a:prstGeom prst="chevron">
-          <a:avLst/>
-        </a:prstGeom>
-        <a:solidFill>
-          <a:schemeClr val="accent1">
-            <a:hueOff val="0"/>
-            <a:satOff val="0"/>
-            <a:lumOff val="0"/>
-            <a:alphaOff val="0"/>
-          </a:schemeClr>
-        </a:solidFill>
-        <a:ln w="25400" cap="flat" cmpd="sng" algn="ctr">
-          <a:solidFill>
-            <a:schemeClr val="lt1">
-              <a:hueOff val="0"/>
-              <a:satOff val="0"/>
-              <a:lumOff val="0"/>
-              <a:alphaOff val="0"/>
-            </a:schemeClr>
-          </a:solidFill>
-          <a:prstDash val="solid"/>
-        </a:ln>
-        <a:effectLst/>
-      </dsp:spPr>
-      <dsp:style>
-        <a:lnRef idx="2">
-          <a:scrgbClr r="0" g="0" b="0"/>
-        </a:lnRef>
-        <a:fillRef idx="1">
-          <a:scrgbClr r="0" g="0" b="0"/>
-        </a:fillRef>
-        <a:effectRef idx="0">
-          <a:scrgbClr r="0" g="0" b="0"/>
-        </a:effectRef>
-        <a:fontRef idx="minor">
-          <a:schemeClr val="lt1"/>
-        </a:fontRef>
-      </dsp:style>
-      <dsp:txBody>
-        <a:bodyPr spcFirstLastPara="0" vert="horz" wrap="square" lIns="108000" tIns="37338" rIns="18669" bIns="37338" numCol="1" spcCol="1270" anchor="ctr" anchorCtr="0">
-          <a:noAutofit/>
-        </a:bodyPr>
-        <a:lstStyle/>
-        <a:p>
-          <a:pPr lvl="0" algn="l" defTabSz="622300">
-            <a:lnSpc>
-              <a:spcPct val="90000"/>
-            </a:lnSpc>
-            <a:spcBef>
-              <a:spcPct val="0"/>
-            </a:spcBef>
-            <a:spcAft>
-              <a:spcPct val="35000"/>
-            </a:spcAft>
-          </a:pPr>
-          <a:r>
-            <a:rPr lang="de-DE" sz="1400" kern="1200" dirty="0" smtClean="0"/>
-            <a:t>2013</a:t>
-          </a:r>
-          <a:endParaRPr lang="de-DE" sz="1400" kern="1200" dirty="0"/>
-        </a:p>
-      </dsp:txBody>
-      <dsp:txXfrm>
-        <a:off x="5872488" y="0"/>
-        <a:ext cx="1106555" cy="324000"/>
-      </dsp:txXfrm>
-    </dsp:sp>
-    <dsp:sp modelId="{9F1AF042-3B71-4A00-9C21-86DDDDCFE194}">
-      <dsp:nvSpPr>
-        <dsp:cNvPr id="0" name=""/>
-        <dsp:cNvSpPr/>
-      </dsp:nvSpPr>
-      <dsp:spPr>
-        <a:xfrm>
-          <a:off x="6854933" y="0"/>
-          <a:ext cx="1430555" cy="324000"/>
-        </a:xfrm>
-        <a:prstGeom prst="chevron">
-          <a:avLst/>
-        </a:prstGeom>
-        <a:solidFill>
-          <a:schemeClr val="accent1">
-            <a:hueOff val="0"/>
-            <a:satOff val="0"/>
-            <a:lumOff val="0"/>
-            <a:alphaOff val="0"/>
-          </a:schemeClr>
-        </a:solidFill>
-        <a:ln w="25400" cap="flat" cmpd="sng" algn="ctr">
-          <a:solidFill>
-            <a:schemeClr val="lt1">
-              <a:hueOff val="0"/>
-              <a:satOff val="0"/>
-              <a:lumOff val="0"/>
-              <a:alphaOff val="0"/>
-            </a:schemeClr>
-          </a:solidFill>
-          <a:prstDash val="solid"/>
-        </a:ln>
-        <a:effectLst/>
-      </dsp:spPr>
-      <dsp:style>
-        <a:lnRef idx="2">
-          <a:scrgbClr r="0" g="0" b="0"/>
-        </a:lnRef>
-        <a:fillRef idx="1">
-          <a:scrgbClr r="0" g="0" b="0"/>
-        </a:fillRef>
-        <a:effectRef idx="0">
-          <a:scrgbClr r="0" g="0" b="0"/>
-        </a:effectRef>
-        <a:fontRef idx="minor">
-          <a:schemeClr val="lt1"/>
-        </a:fontRef>
-      </dsp:style>
-      <dsp:txBody>
-        <a:bodyPr spcFirstLastPara="0" vert="horz" wrap="square" lIns="108000" tIns="37338" rIns="18669" bIns="37338" numCol="1" spcCol="1270" anchor="ctr" anchorCtr="0">
-          <a:noAutofit/>
-        </a:bodyPr>
-        <a:lstStyle/>
-        <a:p>
-          <a:pPr lvl="0" algn="l" defTabSz="622300">
-            <a:lnSpc>
-              <a:spcPct val="90000"/>
-            </a:lnSpc>
-            <a:spcBef>
-              <a:spcPct val="0"/>
-            </a:spcBef>
-            <a:spcAft>
-              <a:spcPct val="35000"/>
-            </a:spcAft>
-          </a:pPr>
-          <a:r>
-            <a:rPr lang="de-DE" sz="1400" kern="1200" dirty="0" smtClean="0"/>
-            <a:t>2013-2018</a:t>
-          </a:r>
-          <a:endParaRPr lang="de-DE" sz="1400" kern="1200" dirty="0"/>
-        </a:p>
-      </dsp:txBody>
-      <dsp:txXfrm>
-        <a:off x="7016933" y="0"/>
-        <a:ext cx="1106555" cy="324000"/>
-      </dsp:txXfrm>
-    </dsp:sp>
   </dsp:spTree>
 </dsp:drawing>
 </file>
@@ -3413,7 +2873,7 @@
             <a:fld id="{78886166-FEDD-4C19-84F4-F52DBE7353CD}" type="datetimeFigureOut">
               <a:rPr lang="de-DE" smtClean="0"/>
               <a:pPr algn="r"/>
-              <a:t>25.06.2018</a:t>
+              <a:t>26.06.2018</a:t>
             </a:fld>
             <a:endParaRPr lang="de-DE" dirty="0"/>
           </a:p>
@@ -3642,7 +3102,7 @@
             <a:fld id="{78886166-FEDD-4C19-84F4-F52DBE7353CD}" type="datetimeFigureOut">
               <a:rPr lang="de-DE" smtClean="0"/>
               <a:pPr/>
-              <a:t>25.06.2018</a:t>
+              <a:t>26.06.2018</a:t>
             </a:fld>
             <a:endParaRPr lang="de-DE" dirty="0"/>
           </a:p>
@@ -7403,7 +6863,7 @@
           <a:p>
             <a:fld id="{F0EDA809-E0E6-4C76-B7B6-CD07ACB9F2FF}" type="datetime1">
               <a:rPr lang="de-DE" smtClean="0"/>
-              <a:t>25.06.2018</a:t>
+              <a:t>26.06.2018</a:t>
             </a:fld>
             <a:endParaRPr lang="de-DE" dirty="0"/>
           </a:p>
@@ -7576,7 +7036,7 @@
           <a:p>
             <a:fld id="{2980085E-5812-4CED-9D7E-844CC46B6BD5}" type="datetime1">
               <a:rPr lang="de-DE" smtClean="0"/>
-              <a:t>25.06.2018</a:t>
+              <a:t>26.06.2018</a:t>
             </a:fld>
             <a:endParaRPr lang="de-DE" dirty="0"/>
           </a:p>
@@ -16611,7 +16071,7 @@
           <a:p>
             <a:fld id="{8825E012-5F46-48B3-BE4E-37DDD6BFB8FD}" type="datetime1">
               <a:rPr lang="de-DE" smtClean="0"/>
-              <a:t>25.06.2018</a:t>
+              <a:t>26.06.2018</a:t>
             </a:fld>
             <a:endParaRPr lang="de-DE" dirty="0"/>
           </a:p>
@@ -16753,7 +16213,7 @@
           <a:p>
             <a:fld id="{1C2EF07C-8DB6-4D0F-A235-F17B8759160C}" type="datetime1">
               <a:rPr lang="de-DE" smtClean="0"/>
-              <a:t>25.06.2018</a:t>
+              <a:t>26.06.2018</a:t>
             </a:fld>
             <a:endParaRPr lang="de-DE" dirty="0"/>
           </a:p>
@@ -17078,7 +16538,7 @@
           <a:p>
             <a:fld id="{775138F2-64E7-417A-81B8-C560CB65770F}" type="datetime1">
               <a:rPr lang="de-DE" smtClean="0"/>
-              <a:t>25.06.2018</a:t>
+              <a:t>26.06.2018</a:t>
             </a:fld>
             <a:endParaRPr lang="de-DE" dirty="0"/>
           </a:p>
@@ -17330,7 +16790,7 @@
           <a:p>
             <a:fld id="{746936CD-3BD7-4A56-8980-DE76A03123DC}" type="datetime1">
               <a:rPr lang="de-DE" smtClean="0"/>
-              <a:t>25.06.2018</a:t>
+              <a:t>26.06.2018</a:t>
             </a:fld>
             <a:endParaRPr lang="de-DE" dirty="0"/>
           </a:p>
@@ -21199,7 +20659,7 @@
           <a:p>
             <a:fld id="{E7AE1F48-C0C6-4B28-8CD9-127F7DF43B01}" type="datetime1">
               <a:rPr lang="de-DE" smtClean="0"/>
-              <a:t>25.06.2018</a:t>
+              <a:t>26.06.2018</a:t>
             </a:fld>
             <a:endParaRPr lang="de-DE" dirty="0"/>
           </a:p>
@@ -21552,12 +21012,12 @@
       </p:grpSpPr>
       <p:sp>
         <p:nvSpPr>
-          <p:cNvPr id="9" name="Date Placeholder 8"/>
+          <p:cNvPr id="3" name="Title 2"/>
           <p:cNvSpPr>
             <a:spLocks noGrp="1"/>
           </p:cNvSpPr>
           <p:nvPr>
-            <p:ph type="dt" sz="half" idx="10"/>
+            <p:ph type="title"/>
           </p:nvPr>
         </p:nvSpPr>
         <p:spPr/>
@@ -21565,22 +21025,22 @@
           <a:bodyPr/>
           <a:lstStyle/>
           <a:p>
-            <a:fld id="{E7AE1F48-C0C6-4B28-8CD9-127F7DF43B01}" type="datetime1">
-              <a:rPr lang="de-DE" smtClean="0"/>
-              <a:t>25.06.2018</a:t>
-            </a:fld>
+            <a:r>
+              <a:rPr lang="de-DE" dirty="0" smtClean="0"/>
+              <a:t>Sicherheit</a:t>
+            </a:r>
             <a:endParaRPr lang="de-DE" dirty="0"/>
           </a:p>
         </p:txBody>
       </p:sp>
       <p:sp>
         <p:nvSpPr>
-          <p:cNvPr id="10" name="Footer Placeholder 9"/>
+          <p:cNvPr id="5" name="Date Placeholder 4"/>
           <p:cNvSpPr>
             <a:spLocks noGrp="1"/>
           </p:cNvSpPr>
           <p:nvPr>
-            <p:ph type="ftr" sz="quarter" idx="11"/>
+            <p:ph type="dt" sz="half" idx="14"/>
           </p:nvPr>
         </p:nvSpPr>
         <p:spPr/>
@@ -21588,21 +21048,32 @@
           <a:bodyPr/>
           <a:lstStyle/>
           <a:p>
+            <a:fld id="{5B5E288E-57F9-4B39-B0B4-2DBDDAAA48E2}" type="datetime1">
+              <a:rPr lang="de-DE" smtClean="0"/>
+              <a:t>26.06.2018</a:t>
+            </a:fld>
+            <a:endParaRPr lang="de-DE" dirty="0"/>
+          </a:p>
+        </p:txBody>
+      </p:sp>
+      <p:sp>
+        <p:nvSpPr>
+          <p:cNvPr id="6" name="Footer Placeholder 5"/>
+          <p:cNvSpPr>
+            <a:spLocks noGrp="1"/>
+          </p:cNvSpPr>
+          <p:nvPr>
+            <p:ph type="ftr" sz="quarter" idx="15"/>
+          </p:nvPr>
+        </p:nvSpPr>
+        <p:spPr/>
+        <p:txBody>
+          <a:bodyPr/>
+          <a:lstStyle/>
+          <a:p>
             <a:r>
               <a:rPr lang="de-DE" dirty="0" smtClean="0"/>
-              <a:t>Grundlagen &gt; Geschichte &gt; </a:t>
-            </a:r>
-            <a:r>
-              <a:rPr lang="de-DE" dirty="0" smtClean="0">
-                <a:solidFill>
-                  <a:schemeClr val="bg2"/>
-                </a:solidFill>
-              </a:rPr>
-              <a:t>Evaluation </a:t>
-            </a:r>
-            <a:r>
-              <a:rPr lang="de-DE" dirty="0" smtClean="0"/>
-              <a:t>&gt; </a:t>
+              <a:t>Grundlagen &gt; Geschichte &gt; Evaluation &gt; </a:t>
             </a:r>
             <a:r>
               <a:rPr lang="de-DE" dirty="0" smtClean="0">
@@ -21622,12 +21093,12 @@
       </p:sp>
       <p:sp>
         <p:nvSpPr>
-          <p:cNvPr id="11" name="Slide Number Placeholder 10"/>
+          <p:cNvPr id="7" name="Slide Number Placeholder 6"/>
           <p:cNvSpPr>
             <a:spLocks noGrp="1"/>
           </p:cNvSpPr>
           <p:nvPr>
-            <p:ph type="sldNum" sz="quarter" idx="12"/>
+            <p:ph type="sldNum" sz="quarter" idx="16"/>
           </p:nvPr>
         </p:nvSpPr>
         <p:spPr/>
@@ -21646,7 +21117,7 @@
       </p:sp>
       <p:sp>
         <p:nvSpPr>
-          <p:cNvPr id="7" name="Text Placeholder 6"/>
+          <p:cNvPr id="80" name="Textplatzhalter 1"/>
           <p:cNvSpPr>
             <a:spLocks noGrp="1"/>
           </p:cNvSpPr>
@@ -21654,151 +21125,116 @@
             <p:ph type="body" sz="quarter" idx="13"/>
           </p:nvPr>
         </p:nvSpPr>
-        <p:spPr>
+        <p:spPr bwMode="gray">
           <a:xfrm>
-            <a:off x="4679949" y="1131888"/>
-            <a:ext cx="4032251" cy="3545101"/>
+            <a:off x="1619672" y="1853599"/>
+            <a:ext cx="5904656" cy="1980766"/>
           </a:xfrm>
+          <a:noFill/>
         </p:spPr>
         <p:txBody>
           <a:bodyPr anchor="ctr"/>
           <a:lstStyle/>
           <a:p>
-            <a:pPr lvl="2"/>
+            <a:pPr algn="ctr"/>
             <a:r>
-              <a:rPr lang="de-DE" dirty="0" smtClean="0"/>
-              <a:t>„[Google] starts 2 billion Container each week“ – Joe Beda, Senior Staff Software Engineer at Google Cloud auf Gluecon 2014</a:t>
+              <a:rPr lang="de-DE" sz="2400" i="1" dirty="0" smtClean="0"/>
+              <a:t>I have a co-worker who said: ‚Docker is about running random code downloaded from the Internet and running it as root‘.</a:t>
             </a:r>
-          </a:p>
-          <a:p>
-            <a:pPr lvl="2"/>
-            <a:r>
-              <a:rPr lang="de-DE" dirty="0" smtClean="0"/>
-              <a:t>Orchestrierung einzelner Container unerlässlich</a:t>
-            </a:r>
-            <a:endParaRPr lang="de-DE" dirty="0"/>
-          </a:p>
-          <a:p>
-            <a:pPr lvl="2"/>
-            <a:r>
-              <a:rPr lang="de-DE" dirty="0" smtClean="0"/>
-              <a:t>Container + isolierter Prozess die neuen Bausteine von Software</a:t>
-            </a:r>
-          </a:p>
-          <a:p>
-            <a:pPr lvl="2"/>
-            <a:r>
-              <a:rPr lang="de-DE" dirty="0" smtClean="0"/>
-              <a:t>Kubernetes größter Anbieter für Orchestrator</a:t>
-            </a:r>
-          </a:p>
-          <a:p>
-            <a:pPr lvl="3"/>
-            <a:r>
-              <a:rPr lang="de-DE" dirty="0" smtClean="0"/>
-              <a:t>2014 bei Google gestartet</a:t>
-            </a:r>
-          </a:p>
-          <a:p>
-            <a:pPr lvl="3"/>
-            <a:r>
-              <a:rPr lang="de-DE" dirty="0" smtClean="0"/>
-              <a:t>Mittlerweile CNCF Graduate</a:t>
-            </a:r>
-          </a:p>
-          <a:p>
-            <a:pPr lvl="2"/>
-            <a:r>
-              <a:rPr lang="de-DE" dirty="0" smtClean="0"/>
-              <a:t>Cloud Foundry automatisiert Container</a:t>
-            </a:r>
-          </a:p>
-          <a:p>
-            <a:pPr lvl="3"/>
-            <a:r>
-              <a:rPr lang="de-DE" dirty="0" smtClean="0"/>
-              <a:t>Pushen des Droplet</a:t>
-            </a:r>
-          </a:p>
-          <a:p>
-            <a:pPr lvl="3"/>
-            <a:r>
-              <a:rPr lang="de-DE" dirty="0" smtClean="0"/>
-              <a:t>Deploy and Publish automatisch nach Config</a:t>
-            </a:r>
+            <a:endParaRPr lang="de-DE" sz="2400" i="1" dirty="0"/>
           </a:p>
         </p:txBody>
       </p:sp>
       <p:sp>
         <p:nvSpPr>
-          <p:cNvPr id="6" name="Title 5"/>
-          <p:cNvSpPr>
-            <a:spLocks noGrp="1"/>
-          </p:cNvSpPr>
-          <p:nvPr>
-            <p:ph type="title"/>
-          </p:nvPr>
-        </p:nvSpPr>
-        <p:spPr/>
-        <p:txBody>
-          <a:bodyPr/>
-          <a:lstStyle/>
-          <a:p>
-            <a:r>
-              <a:rPr lang="de-DE" dirty="0" smtClean="0"/>
-              <a:t>Orchestrierung</a:t>
-            </a:r>
-            <a:endParaRPr lang="de-DE" dirty="0"/>
-          </a:p>
-        </p:txBody>
-      </p:sp>
-      <p:pic>
-        <p:nvPicPr>
-          <p:cNvPr id="7170" name="Picture 2" descr="Bildergebnis fÃ¼r Kubernetes logo"/>
-          <p:cNvPicPr>
-            <a:picLocks noGrp="1" noChangeAspect="1" noChangeArrowheads="1"/>
-          </p:cNvPicPr>
-          <p:nvPr>
-            <p:ph type="pic" sz="quarter" idx="14"/>
-          </p:nvPr>
-        </p:nvPicPr>
-        <p:blipFill rotWithShape="1">
-          <a:blip r:embed="rId2" cstate="print">
-            <a:extLst>
-              <a:ext uri="{28A0092B-C50C-407E-A947-70E740481C1C}">
-                <a14:useLocalDpi xmlns:a14="http://schemas.microsoft.com/office/drawing/2010/main" val="0"/>
-              </a:ext>
-            </a:extLst>
-          </a:blip>
-          <a:srcRect l="-5295" r="-5295"/>
-          <a:stretch/>
-        </p:blipFill>
-        <p:spPr bwMode="auto">
-          <a:prstGeom prst="rect">
-            <a:avLst/>
-          </a:prstGeom>
-          <a:noFill/>
-          <a:extLst>
-            <a:ext uri="{909E8E84-426E-40DD-AFC4-6F175D3DCCD1}">
-              <a14:hiddenFill xmlns:a14="http://schemas.microsoft.com/office/drawing/2010/main">
-                <a:solidFill>
-                  <a:srgbClr val="FFFFFF"/>
-                </a:solidFill>
-              </a14:hiddenFill>
-            </a:ext>
-          </a:extLst>
-        </p:spPr>
-      </p:pic>
-      <p:sp>
-        <p:nvSpPr>
-          <p:cNvPr id="12" name="TextBox 11"/>
+          <p:cNvPr id="81" name="Textfeld 3"/>
           <p:cNvSpPr txBox="1"/>
           <p:nvPr/>
         </p:nvSpPr>
         <p:spPr bwMode="gray">
           <a:xfrm>
-            <a:off x="450890" y="4604633"/>
-            <a:ext cx="3185006" cy="109362"/>
+            <a:off x="2195736" y="1851670"/>
+            <a:ext cx="468052" cy="504056"/>
+          </a:xfrm>
+          <a:prstGeom prst="rect">
+            <a:avLst/>
+          </a:prstGeom>
+          <a:noFill/>
+        </p:spPr>
+        <p:txBody>
+          <a:bodyPr wrap="square" lIns="0" tIns="0" rIns="0" bIns="0" rtlCol="0" anchor="ctr">
+            <a:noAutofit/>
+          </a:bodyPr>
+          <a:lstStyle/>
+          <a:p>
+            <a:pPr marL="270000" indent="-270000" algn="ctr">
+              <a:spcBef>
+                <a:spcPts val="300"/>
+              </a:spcBef>
+              <a:spcAft>
+                <a:spcPts val="300"/>
+              </a:spcAft>
+              <a:buBlip>
+                <a:blip r:embed="rId2"/>
+              </a:buBlip>
+            </a:pPr>
+            <a:r>
+              <a:rPr lang="de-DE" sz="3600" dirty="0" smtClean="0"/>
+              <a:t> </a:t>
+            </a:r>
+          </a:p>
+        </p:txBody>
+      </p:sp>
+      <p:sp>
+        <p:nvSpPr>
+          <p:cNvPr id="82" name="Textfeld 168"/>
+          <p:cNvSpPr txBox="1"/>
+          <p:nvPr/>
+        </p:nvSpPr>
+        <p:spPr bwMode="gray">
+          <a:xfrm>
+            <a:off x="6569999" y="3330309"/>
+            <a:ext cx="468052" cy="504056"/>
+          </a:xfrm>
+          <a:prstGeom prst="rect">
+            <a:avLst/>
+          </a:prstGeom>
+          <a:noFill/>
+        </p:spPr>
+        <p:txBody>
+          <a:bodyPr wrap="square" lIns="0" tIns="0" rIns="0" bIns="0" rtlCol="0" anchor="ctr">
+            <a:noAutofit/>
+          </a:bodyPr>
+          <a:lstStyle/>
+          <a:p>
+            <a:pPr marL="270000" indent="-270000" algn="ctr">
+              <a:spcBef>
+                <a:spcPts val="300"/>
+              </a:spcBef>
+              <a:spcAft>
+                <a:spcPts val="300"/>
+              </a:spcAft>
+              <a:buBlip>
+                <a:blip r:embed="rId2"/>
+              </a:buBlip>
+            </a:pPr>
+            <a:r>
+              <a:rPr lang="de-DE" sz="3600" dirty="0" smtClean="0"/>
+              <a:t> </a:t>
+            </a:r>
+          </a:p>
+        </p:txBody>
+      </p:sp>
+      <p:sp>
+        <p:nvSpPr>
+          <p:cNvPr id="2" name="TextBox 1"/>
+          <p:cNvSpPr txBox="1"/>
+          <p:nvPr/>
+        </p:nvSpPr>
+        <p:spPr bwMode="gray">
+          <a:xfrm>
+            <a:off x="5436096" y="3834365"/>
+            <a:ext cx="2088232" cy="288032"/>
           </a:xfrm>
           <a:prstGeom prst="rect">
             <a:avLst/>
@@ -21823,25 +21259,17 @@
               </a:buClr>
             </a:pPr>
             <a:r>
-              <a:rPr lang="de-DE" sz="500" dirty="0">
-                <a:solidFill>
-                  <a:schemeClr val="bg2"/>
-                </a:solidFill>
-              </a:rPr>
-              <a:t>Source:https://i1.wp.com/www.stefreitag.de/wp/wp-content/uploads/2018/04/logo_with_border.png?ssl=1</a:t>
+              <a:rPr lang="de-DE" sz="1600" dirty="0" smtClean="0"/>
+              <a:t>- Dan Walsh (Red Hat)</a:t>
             </a:r>
-            <a:endParaRPr lang="en-US" sz="500" dirty="0" err="1" smtClean="0">
-              <a:solidFill>
-                <a:schemeClr val="bg2"/>
-              </a:solidFill>
-            </a:endParaRPr>
+            <a:endParaRPr lang="en-US" sz="1600" dirty="0" err="1" smtClean="0"/>
           </a:p>
         </p:txBody>
       </p:sp>
     </p:spTree>
     <p:extLst>
       <p:ext uri="{BB962C8B-B14F-4D97-AF65-F5344CB8AC3E}">
-        <p14:creationId xmlns:p14="http://schemas.microsoft.com/office/powerpoint/2010/main" val="1627927687"/>
+        <p14:creationId xmlns:p14="http://schemas.microsoft.com/office/powerpoint/2010/main" val="246005062"/>
       </p:ext>
     </p:extLst>
   </p:cSld>
@@ -21867,304 +21295,6 @@
       </p:par>
     </p:tnLst>
   </p:timing>
-</p:sld>
-</file>
-
-<file path=ppt/slides/slide12.xml><?xml version="1.0" encoding="utf-8"?>
-<p:sld xmlns:a="http://schemas.openxmlformats.org/drawingml/2006/main" xmlns:r="http://schemas.openxmlformats.org/officeDocument/2006/relationships" xmlns:p="http://schemas.openxmlformats.org/presentationml/2006/main">
-  <p:cSld>
-    <p:spTree>
-      <p:nvGrpSpPr>
-        <p:cNvPr id="1" name=""/>
-        <p:cNvGrpSpPr/>
-        <p:nvPr/>
-      </p:nvGrpSpPr>
-      <p:grpSpPr>
-        <a:xfrm>
-          <a:off x="0" y="0"/>
-          <a:ext cx="0" cy="0"/>
-          <a:chOff x="0" y="0"/>
-          <a:chExt cx="0" cy="0"/>
-        </a:xfrm>
-      </p:grpSpPr>
-      <p:sp>
-        <p:nvSpPr>
-          <p:cNvPr id="3" name="Title 2"/>
-          <p:cNvSpPr>
-            <a:spLocks noGrp="1"/>
-          </p:cNvSpPr>
-          <p:nvPr>
-            <p:ph type="title"/>
-          </p:nvPr>
-        </p:nvSpPr>
-        <p:spPr/>
-        <p:txBody>
-          <a:bodyPr/>
-          <a:lstStyle/>
-          <a:p>
-            <a:r>
-              <a:rPr lang="de-DE" dirty="0" smtClean="0"/>
-              <a:t>Sicherheit</a:t>
-            </a:r>
-            <a:endParaRPr lang="de-DE" dirty="0"/>
-          </a:p>
-        </p:txBody>
-      </p:sp>
-      <p:sp>
-        <p:nvSpPr>
-          <p:cNvPr id="5" name="Date Placeholder 4"/>
-          <p:cNvSpPr>
-            <a:spLocks noGrp="1"/>
-          </p:cNvSpPr>
-          <p:nvPr>
-            <p:ph type="dt" sz="half" idx="14"/>
-          </p:nvPr>
-        </p:nvSpPr>
-        <p:spPr/>
-        <p:txBody>
-          <a:bodyPr/>
-          <a:lstStyle/>
-          <a:p>
-            <a:fld id="{5B5E288E-57F9-4B39-B0B4-2DBDDAAA48E2}" type="datetime1">
-              <a:rPr lang="de-DE" smtClean="0"/>
-              <a:t>25.06.2018</a:t>
-            </a:fld>
-            <a:endParaRPr lang="de-DE" dirty="0"/>
-          </a:p>
-        </p:txBody>
-      </p:sp>
-      <p:sp>
-        <p:nvSpPr>
-          <p:cNvPr id="6" name="Footer Placeholder 5"/>
-          <p:cNvSpPr>
-            <a:spLocks noGrp="1"/>
-          </p:cNvSpPr>
-          <p:nvPr>
-            <p:ph type="ftr" sz="quarter" idx="15"/>
-          </p:nvPr>
-        </p:nvSpPr>
-        <p:spPr/>
-        <p:txBody>
-          <a:bodyPr/>
-          <a:lstStyle/>
-          <a:p>
-            <a:r>
-              <a:rPr lang="de-DE" dirty="0" smtClean="0"/>
-              <a:t>Grundlagen &gt; Geschichte &gt; Evaluation &gt; </a:t>
-            </a:r>
-            <a:r>
-              <a:rPr lang="de-DE" dirty="0" smtClean="0">
-                <a:solidFill>
-                  <a:schemeClr val="accent1"/>
-                </a:solidFill>
-              </a:rPr>
-              <a:t>Aktuelles</a:t>
-            </a:r>
-            <a:endParaRPr lang="de-DE" dirty="0">
-              <a:solidFill>
-                <a:schemeClr val="accent1"/>
-              </a:solidFill>
-            </a:endParaRPr>
-          </a:p>
-        </p:txBody>
-      </p:sp>
-      <p:sp>
-        <p:nvSpPr>
-          <p:cNvPr id="7" name="Slide Number Placeholder 6"/>
-          <p:cNvSpPr>
-            <a:spLocks noGrp="1"/>
-          </p:cNvSpPr>
-          <p:nvPr>
-            <p:ph type="sldNum" sz="quarter" idx="16"/>
-          </p:nvPr>
-        </p:nvSpPr>
-        <p:spPr/>
-        <p:txBody>
-          <a:bodyPr/>
-          <a:lstStyle/>
-          <a:p>
-            <a:fld id="{7F1AF4CC-B4F1-45E7-8781-FCA25AF1F4E6}" type="slidenum">
-              <a:rPr lang="de-DE" smtClean="0"/>
-              <a:pPr/>
-              <a:t>12</a:t>
-            </a:fld>
-            <a:endParaRPr lang="de-DE" dirty="0"/>
-          </a:p>
-        </p:txBody>
-      </p:sp>
-      <p:sp>
-        <p:nvSpPr>
-          <p:cNvPr id="80" name="Textplatzhalter 1"/>
-          <p:cNvSpPr>
-            <a:spLocks noGrp="1"/>
-          </p:cNvSpPr>
-          <p:nvPr>
-            <p:ph type="body" sz="quarter" idx="13"/>
-          </p:nvPr>
-        </p:nvSpPr>
-        <p:spPr bwMode="gray">
-          <a:xfrm>
-            <a:off x="1619672" y="1853599"/>
-            <a:ext cx="5904656" cy="1980766"/>
-          </a:xfrm>
-          <a:noFill/>
-        </p:spPr>
-        <p:txBody>
-          <a:bodyPr anchor="ctr"/>
-          <a:lstStyle/>
-          <a:p>
-            <a:pPr algn="ctr"/>
-            <a:r>
-              <a:rPr lang="de-DE" sz="2400" i="1" dirty="0" smtClean="0"/>
-              <a:t>I have a co-worker who said: ‚Docker is about running random code downloaded from the Internet and running it as root‘.</a:t>
-            </a:r>
-            <a:endParaRPr lang="de-DE" sz="2400" i="1" dirty="0"/>
-          </a:p>
-        </p:txBody>
-      </p:sp>
-      <p:sp>
-        <p:nvSpPr>
-          <p:cNvPr id="81" name="Textfeld 3"/>
-          <p:cNvSpPr txBox="1"/>
-          <p:nvPr/>
-        </p:nvSpPr>
-        <p:spPr bwMode="gray">
-          <a:xfrm>
-            <a:off x="2195736" y="1851670"/>
-            <a:ext cx="468052" cy="504056"/>
-          </a:xfrm>
-          <a:prstGeom prst="rect">
-            <a:avLst/>
-          </a:prstGeom>
-          <a:noFill/>
-        </p:spPr>
-        <p:txBody>
-          <a:bodyPr wrap="square" lIns="0" tIns="0" rIns="0" bIns="0" rtlCol="0" anchor="ctr">
-            <a:noAutofit/>
-          </a:bodyPr>
-          <a:lstStyle/>
-          <a:p>
-            <a:pPr marL="270000" indent="-270000" algn="ctr">
-              <a:spcBef>
-                <a:spcPts val="300"/>
-              </a:spcBef>
-              <a:spcAft>
-                <a:spcPts val="300"/>
-              </a:spcAft>
-              <a:buBlip>
-                <a:blip r:embed="rId2"/>
-              </a:buBlip>
-            </a:pPr>
-            <a:r>
-              <a:rPr lang="de-DE" sz="3600" dirty="0" smtClean="0"/>
-              <a:t> </a:t>
-            </a:r>
-          </a:p>
-        </p:txBody>
-      </p:sp>
-      <p:sp>
-        <p:nvSpPr>
-          <p:cNvPr id="82" name="Textfeld 168"/>
-          <p:cNvSpPr txBox="1"/>
-          <p:nvPr/>
-        </p:nvSpPr>
-        <p:spPr bwMode="gray">
-          <a:xfrm>
-            <a:off x="6569999" y="3330309"/>
-            <a:ext cx="468052" cy="504056"/>
-          </a:xfrm>
-          <a:prstGeom prst="rect">
-            <a:avLst/>
-          </a:prstGeom>
-          <a:noFill/>
-        </p:spPr>
-        <p:txBody>
-          <a:bodyPr wrap="square" lIns="0" tIns="0" rIns="0" bIns="0" rtlCol="0" anchor="ctr">
-            <a:noAutofit/>
-          </a:bodyPr>
-          <a:lstStyle/>
-          <a:p>
-            <a:pPr marL="270000" indent="-270000" algn="ctr">
-              <a:spcBef>
-                <a:spcPts val="300"/>
-              </a:spcBef>
-              <a:spcAft>
-                <a:spcPts val="300"/>
-              </a:spcAft>
-              <a:buBlip>
-                <a:blip r:embed="rId2"/>
-              </a:buBlip>
-            </a:pPr>
-            <a:r>
-              <a:rPr lang="de-DE" sz="3600" dirty="0" smtClean="0"/>
-              <a:t> </a:t>
-            </a:r>
-          </a:p>
-        </p:txBody>
-      </p:sp>
-      <p:sp>
-        <p:nvSpPr>
-          <p:cNvPr id="2" name="TextBox 1"/>
-          <p:cNvSpPr txBox="1"/>
-          <p:nvPr/>
-        </p:nvSpPr>
-        <p:spPr bwMode="gray">
-          <a:xfrm>
-            <a:off x="5436096" y="3834365"/>
-            <a:ext cx="2088232" cy="288032"/>
-          </a:xfrm>
-          <a:prstGeom prst="rect">
-            <a:avLst/>
-          </a:prstGeom>
-          <a:noFill/>
-        </p:spPr>
-        <p:txBody>
-          <a:bodyPr wrap="square" lIns="0" tIns="0" rIns="0" bIns="0" rtlCol="0">
-            <a:noAutofit/>
-          </a:bodyPr>
-          <a:lstStyle/>
-          <a:p>
-            <a:pPr>
-              <a:spcBef>
-                <a:spcPts val="300"/>
-              </a:spcBef>
-              <a:spcAft>
-                <a:spcPts val="300"/>
-              </a:spcAft>
-              <a:buClr>
-                <a:schemeClr val="accent1"/>
-              </a:buClr>
-            </a:pPr>
-            <a:r>
-              <a:rPr lang="de-DE" sz="1600" dirty="0" smtClean="0"/>
-              <a:t>- Dan Walsh (Red Hat)</a:t>
-            </a:r>
-            <a:endParaRPr lang="en-US" sz="1600" dirty="0" err="1" smtClean="0"/>
-          </a:p>
-        </p:txBody>
-      </p:sp>
-    </p:spTree>
-    <p:extLst>
-      <p:ext uri="{BB962C8B-B14F-4D97-AF65-F5344CB8AC3E}">
-        <p14:creationId xmlns:p14="http://schemas.microsoft.com/office/powerpoint/2010/main" val="246005062"/>
-      </p:ext>
-    </p:extLst>
-  </p:cSld>
-  <p:clrMapOvr>
-    <a:masterClrMapping/>
-  </p:clrMapOvr>
-  <mc:AlternateContent xmlns:mc="http://schemas.openxmlformats.org/markup-compatibility/2006" xmlns:p14="http://schemas.microsoft.com/office/powerpoint/2010/main">
-    <mc:Choice Requires="p14">
-      <p:transition spd="med" p14:dur="700">
-        <p:fade/>
-      </p:transition>
-    </mc:Choice>
-    <mc:Fallback xmlns="">
-      <p:transition spd="med">
-        <p:fade/>
-      </p:transition>
-    </mc:Fallback>
-  </mc:AlternateContent>
 </p:sld>
 </file>
 
@@ -22202,7 +21332,7 @@
           <a:p>
             <a:fld id="{9F410B72-7BEA-4D24-BAE7-EC94C9083856}" type="datetime1">
               <a:rPr lang="de-DE" smtClean="0"/>
-              <a:t>25.06.2018</a:t>
+              <a:t>26.06.2018</a:t>
             </a:fld>
             <a:endParaRPr lang="de-DE" dirty="0"/>
           </a:p>
@@ -23387,7 +22517,7 @@
           <a:p>
             <a:fld id="{E7AE1F48-C0C6-4B28-8CD9-127F7DF43B01}" type="datetime1">
               <a:rPr lang="de-DE" smtClean="0"/>
-              <a:t>25.06.2018</a:t>
+              <a:t>26.06.2018</a:t>
             </a:fld>
             <a:endParaRPr lang="de-DE" dirty="0"/>
           </a:p>
@@ -24127,7 +23257,7 @@
           <a:p>
             <a:fld id="{BF670171-00E8-4F3B-99F4-DEA099A6FCC5}" type="datetime1">
               <a:rPr lang="de-DE" smtClean="0"/>
-              <a:t>25.06.2018</a:t>
+              <a:t>26.06.2018</a:t>
             </a:fld>
             <a:endParaRPr lang="de-DE" dirty="0"/>
           </a:p>
@@ -24276,7 +23406,7 @@
           <a:p>
             <a:fld id="{7196E61A-D367-4733-9CD8-D3F4CD4B2464}" type="datetime1">
               <a:rPr lang="de-DE" smtClean="0"/>
-              <a:t>25.06.2018</a:t>
+              <a:t>26.06.2018</a:t>
             </a:fld>
             <a:endParaRPr lang="de-DE" dirty="0"/>
           </a:p>
@@ -24970,15 +24100,7 @@
             </a:pPr>
             <a:r>
               <a:rPr lang="de-DE" sz="1000" b="1" dirty="0" smtClean="0"/>
-              <a:t>FreeBSD Jails, </a:t>
-            </a:r>
-            <a:r>
-              <a:rPr lang="de-DE" sz="1000" b="1" dirty="0" smtClean="0"/>
-              <a:t>Linux VServer</a:t>
-            </a:r>
-            <a:r>
-              <a:rPr lang="de-DE" sz="1000" b="1" dirty="0" smtClean="0"/>
-              <a:t>,  Solaris Container, OpenVZ</a:t>
+              <a:t>FreeBSD Jails, Linux VServer,  Solaris Container, OpenVZ</a:t>
             </a:r>
           </a:p>
           <a:p>
@@ -25371,7 +24493,7 @@
           <a:p>
             <a:fld id="{E7AE1F48-C0C6-4B28-8CD9-127F7DF43B01}" type="datetime1">
               <a:rPr lang="de-DE" smtClean="0"/>
-              <a:t>25.06.2018</a:t>
+              <a:t>26.06.2018</a:t>
             </a:fld>
             <a:endParaRPr lang="de-DE" dirty="0"/>
           </a:p>
@@ -25911,7 +25033,7 @@
           <a:p>
             <a:fld id="{E7AE1F48-C0C6-4B28-8CD9-127F7DF43B01}" type="datetime1">
               <a:rPr lang="de-DE" smtClean="0"/>
-              <a:t>25.06.2018</a:t>
+              <a:t>26.06.2018</a:t>
             </a:fld>
             <a:endParaRPr lang="de-DE" dirty="0"/>
           </a:p>
@@ -26261,7 +25383,7 @@
           <a:p>
             <a:fld id="{E7AE1F48-C0C6-4B28-8CD9-127F7DF43B01}" type="datetime1">
               <a:rPr lang="de-DE" smtClean="0"/>
-              <a:t>25.06.2018</a:t>
+              <a:t>26.06.2018</a:t>
             </a:fld>
             <a:endParaRPr lang="de-DE" dirty="0"/>
           </a:p>
@@ -26455,7 +25577,7 @@
           <a:p>
             <a:r>
               <a:rPr lang="de-DE" dirty="0" smtClean="0"/>
-              <a:t>rkt</a:t>
+              <a:t>LXD</a:t>
             </a:r>
             <a:endParaRPr lang="de-DE" dirty="0"/>
           </a:p>
@@ -26613,7 +25735,7 @@
           <a:p>
             <a:fld id="{E7AE1F48-C0C6-4B28-8CD9-127F7DF43B01}" type="datetime1">
               <a:rPr lang="de-DE" smtClean="0"/>
-              <a:t>25.06.2018</a:t>
+              <a:t>26.06.2018</a:t>
             </a:fld>
             <a:endParaRPr lang="de-DE" dirty="0"/>
           </a:p>
@@ -26708,7 +25830,7 @@
             <a:pPr lvl="2"/>
             <a:r>
               <a:rPr lang="de-DE" dirty="0" smtClean="0"/>
-              <a:t>Enutzt von Docker, Kubernetes</a:t>
+              <a:t>Genutzt von Docker, Kubernetes</a:t>
             </a:r>
           </a:p>
           <a:p>
@@ -26778,7 +25900,7 @@
                   <a:schemeClr val="accent1"/>
                 </a:solidFill>
               </a:rPr>
-              <a:t>runC als standardisiert Runtime findet großen Anklang. Ohne Docker, Kubernetes oder andere Managing-Tools ist runC allerdings recht komplex und Low Level</a:t>
+              <a:t>runC als standardisierte Runtime findet großen Anklang. Ohne Docker, Kubernetes oder andere Managing-Tools ist runC allerdings recht komplex und Low Level</a:t>
             </a:r>
           </a:p>
         </p:txBody>

</xml_diff>